<commit_message>
ajout phone + ajout maquettes dans doc-technique
</commit_message>
<xml_diff>
--- a/template/app-mockup.pptx
+++ b/template/app-mockup.pptx
@@ -3225,6 +3225,42 @@
           </a:p>
         </p:txBody>
       </p:sp>
+      <p:pic>
+        <p:nvPicPr>
+          <p:cNvPr id="8" name="Image 7" descr="Une image contenant miroir, dessin&#10;&#10;Description générée automatiquement">
+            <a:extLst>
+              <a:ext uri="{FF2B5EF4-FFF2-40B4-BE49-F238E27FC236}">
+                <a16:creationId xmlns:a16="http://schemas.microsoft.com/office/drawing/2014/main" id="{5DB459AC-1ADD-4C3A-8101-D2D62614A569}"/>
+              </a:ext>
+            </a:extLst>
+          </p:cNvPr>
+          <p:cNvPicPr>
+            <a:picLocks noChangeAspect="1"/>
+          </p:cNvPicPr>
+          <p:nvPr/>
+        </p:nvPicPr>
+        <p:blipFill>
+          <a:blip r:embed="rId2">
+            <a:extLst>
+              <a:ext uri="{28A0092B-C50C-407E-A947-70E740481C1C}">
+                <a14:useLocalDpi xmlns:a14="http://schemas.microsoft.com/office/drawing/2010/main" val="0"/>
+              </a:ext>
+            </a:extLst>
+          </a:blip>
+          <a:stretch>
+            <a:fillRect/>
+          </a:stretch>
+        </p:blipFill>
+        <p:spPr>
+          <a:xfrm>
+            <a:off x="-4279900" y="-762000"/>
+            <a:ext cx="15417800" cy="13614400"/>
+          </a:xfrm>
+          <a:prstGeom prst="rect">
+            <a:avLst/>
+          </a:prstGeom>
+        </p:spPr>
+      </p:pic>
     </p:spTree>
     <p:extLst>
       <p:ext uri="{BB962C8B-B14F-4D97-AF65-F5344CB8AC3E}">
@@ -3989,6 +4025,42 @@
           </a:p>
         </p:txBody>
       </p:sp>
+      <p:pic>
+        <p:nvPicPr>
+          <p:cNvPr id="29" name="Image 28" descr="Une image contenant miroir, dessin&#10;&#10;Description générée automatiquement">
+            <a:extLst>
+              <a:ext uri="{FF2B5EF4-FFF2-40B4-BE49-F238E27FC236}">
+                <a16:creationId xmlns:a16="http://schemas.microsoft.com/office/drawing/2014/main" id="{7EEBAB3B-0F3F-4205-A311-73ABDAFE1BCF}"/>
+              </a:ext>
+            </a:extLst>
+          </p:cNvPr>
+          <p:cNvPicPr>
+            <a:picLocks noChangeAspect="1"/>
+          </p:cNvPicPr>
+          <p:nvPr/>
+        </p:nvPicPr>
+        <p:blipFill>
+          <a:blip r:embed="rId2">
+            <a:extLst>
+              <a:ext uri="{28A0092B-C50C-407E-A947-70E740481C1C}">
+                <a14:useLocalDpi xmlns:a14="http://schemas.microsoft.com/office/drawing/2010/main" val="0"/>
+              </a:ext>
+            </a:extLst>
+          </a:blip>
+          <a:stretch>
+            <a:fillRect/>
+          </a:stretch>
+        </p:blipFill>
+        <p:spPr>
+          <a:xfrm>
+            <a:off x="-4279900" y="-762000"/>
+            <a:ext cx="15417800" cy="13614400"/>
+          </a:xfrm>
+          <a:prstGeom prst="rect">
+            <a:avLst/>
+          </a:prstGeom>
+        </p:spPr>
+      </p:pic>
     </p:spTree>
     <p:extLst>
       <p:ext uri="{BB962C8B-B14F-4D97-AF65-F5344CB8AC3E}">
@@ -5237,6 +5309,42 @@
           <a:xfrm>
             <a:off x="3667611" y="11430599"/>
             <a:ext cx="540000" cy="540000"/>
+          </a:xfrm>
+          <a:prstGeom prst="rect">
+            <a:avLst/>
+          </a:prstGeom>
+        </p:spPr>
+      </p:pic>
+      <p:pic>
+        <p:nvPicPr>
+          <p:cNvPr id="32" name="Image 31" descr="Une image contenant miroir, dessin&#10;&#10;Description générée automatiquement">
+            <a:extLst>
+              <a:ext uri="{FF2B5EF4-FFF2-40B4-BE49-F238E27FC236}">
+                <a16:creationId xmlns:a16="http://schemas.microsoft.com/office/drawing/2014/main" id="{8928983B-B280-4CCE-8666-6B0AD9649B24}"/>
+              </a:ext>
+            </a:extLst>
+          </p:cNvPr>
+          <p:cNvPicPr>
+            <a:picLocks noChangeAspect="1"/>
+          </p:cNvPicPr>
+          <p:nvPr/>
+        </p:nvPicPr>
+        <p:blipFill>
+          <a:blip r:embed="rId22">
+            <a:extLst>
+              <a:ext uri="{28A0092B-C50C-407E-A947-70E740481C1C}">
+                <a14:useLocalDpi xmlns:a14="http://schemas.microsoft.com/office/drawing/2010/main" val="0"/>
+              </a:ext>
+            </a:extLst>
+          </a:blip>
+          <a:stretch>
+            <a:fillRect/>
+          </a:stretch>
+        </p:blipFill>
+        <p:spPr>
+          <a:xfrm>
+            <a:off x="-4279900" y="-762000"/>
+            <a:ext cx="15417800" cy="13614400"/>
           </a:xfrm>
           <a:prstGeom prst="rect">
             <a:avLst/>
@@ -6020,6 +6128,42 @@
           </a:prstGeom>
         </p:spPr>
       </p:pic>
+      <p:pic>
+        <p:nvPicPr>
+          <p:cNvPr id="23" name="Image 22" descr="Une image contenant miroir, dessin&#10;&#10;Description générée automatiquement">
+            <a:extLst>
+              <a:ext uri="{FF2B5EF4-FFF2-40B4-BE49-F238E27FC236}">
+                <a16:creationId xmlns:a16="http://schemas.microsoft.com/office/drawing/2014/main" id="{86FB3A0C-6AFB-4A7A-9305-C5A051269118}"/>
+              </a:ext>
+            </a:extLst>
+          </p:cNvPr>
+          <p:cNvPicPr>
+            <a:picLocks noChangeAspect="1"/>
+          </p:cNvPicPr>
+          <p:nvPr/>
+        </p:nvPicPr>
+        <p:blipFill>
+          <a:blip r:embed="rId18">
+            <a:extLst>
+              <a:ext uri="{28A0092B-C50C-407E-A947-70E740481C1C}">
+                <a14:useLocalDpi xmlns:a14="http://schemas.microsoft.com/office/drawing/2010/main" val="0"/>
+              </a:ext>
+            </a:extLst>
+          </a:blip>
+          <a:stretch>
+            <a:fillRect/>
+          </a:stretch>
+        </p:blipFill>
+        <p:spPr>
+          <a:xfrm>
+            <a:off x="-4279900" y="-762000"/>
+            <a:ext cx="15417800" cy="13614400"/>
+          </a:xfrm>
+          <a:prstGeom prst="rect">
+            <a:avLst/>
+          </a:prstGeom>
+        </p:spPr>
+      </p:pic>
     </p:spTree>
     <p:extLst>
       <p:ext uri="{BB962C8B-B14F-4D97-AF65-F5344CB8AC3E}">
@@ -7598,6 +7742,42 @@
           <a:xfrm>
             <a:off x="3667611" y="11430599"/>
             <a:ext cx="540000" cy="540000"/>
+          </a:xfrm>
+          <a:prstGeom prst="rect">
+            <a:avLst/>
+          </a:prstGeom>
+        </p:spPr>
+      </p:pic>
+      <p:pic>
+        <p:nvPicPr>
+          <p:cNvPr id="43" name="Image 42" descr="Une image contenant miroir, dessin&#10;&#10;Description générée automatiquement">
+            <a:extLst>
+              <a:ext uri="{FF2B5EF4-FFF2-40B4-BE49-F238E27FC236}">
+                <a16:creationId xmlns:a16="http://schemas.microsoft.com/office/drawing/2014/main" id="{341BCFFC-296E-4963-B0B0-A8FF1E0B24BD}"/>
+              </a:ext>
+            </a:extLst>
+          </p:cNvPr>
+          <p:cNvPicPr>
+            <a:picLocks noChangeAspect="1"/>
+          </p:cNvPicPr>
+          <p:nvPr/>
+        </p:nvPicPr>
+        <p:blipFill>
+          <a:blip r:embed="rId10">
+            <a:extLst>
+              <a:ext uri="{28A0092B-C50C-407E-A947-70E740481C1C}">
+                <a14:useLocalDpi xmlns:a14="http://schemas.microsoft.com/office/drawing/2010/main" val="0"/>
+              </a:ext>
+            </a:extLst>
+          </a:blip>
+          <a:stretch>
+            <a:fillRect/>
+          </a:stretch>
+        </p:blipFill>
+        <p:spPr>
+          <a:xfrm>
+            <a:off x="-4279900" y="-762000"/>
+            <a:ext cx="15417800" cy="13614400"/>
           </a:xfrm>
           <a:prstGeom prst="rect">
             <a:avLst/>
@@ -8845,6 +9025,42 @@
           </a:p>
         </p:txBody>
       </p:sp>
+      <p:pic>
+        <p:nvPicPr>
+          <p:cNvPr id="30" name="Image 29" descr="Une image contenant miroir, dessin&#10;&#10;Description générée automatiquement">
+            <a:extLst>
+              <a:ext uri="{FF2B5EF4-FFF2-40B4-BE49-F238E27FC236}">
+                <a16:creationId xmlns:a16="http://schemas.microsoft.com/office/drawing/2014/main" id="{5B58AAF9-0A0E-4CD2-9F9E-12347BA322A4}"/>
+              </a:ext>
+            </a:extLst>
+          </p:cNvPr>
+          <p:cNvPicPr>
+            <a:picLocks noChangeAspect="1"/>
+          </p:cNvPicPr>
+          <p:nvPr/>
+        </p:nvPicPr>
+        <p:blipFill>
+          <a:blip r:embed="rId28">
+            <a:extLst>
+              <a:ext uri="{28A0092B-C50C-407E-A947-70E740481C1C}">
+                <a14:useLocalDpi xmlns:a14="http://schemas.microsoft.com/office/drawing/2010/main" val="0"/>
+              </a:ext>
+            </a:extLst>
+          </a:blip>
+          <a:stretch>
+            <a:fillRect/>
+          </a:stretch>
+        </p:blipFill>
+        <p:spPr>
+          <a:xfrm>
+            <a:off x="-4279900" y="-762000"/>
+            <a:ext cx="15417800" cy="13614400"/>
+          </a:xfrm>
+          <a:prstGeom prst="rect">
+            <a:avLst/>
+          </a:prstGeom>
+        </p:spPr>
+      </p:pic>
     </p:spTree>
     <p:extLst>
       <p:ext uri="{BB962C8B-B14F-4D97-AF65-F5344CB8AC3E}">
@@ -9797,6 +10013,42 @@
           <a:xfrm>
             <a:off x="3258194" y="6498028"/>
             <a:ext cx="540000" cy="540000"/>
+          </a:xfrm>
+          <a:prstGeom prst="rect">
+            <a:avLst/>
+          </a:prstGeom>
+        </p:spPr>
+      </p:pic>
+      <p:pic>
+        <p:nvPicPr>
+          <p:cNvPr id="25" name="Image 24" descr="Une image contenant miroir, dessin&#10;&#10;Description générée automatiquement">
+            <a:extLst>
+              <a:ext uri="{FF2B5EF4-FFF2-40B4-BE49-F238E27FC236}">
+                <a16:creationId xmlns:a16="http://schemas.microsoft.com/office/drawing/2014/main" id="{BE51567A-1D3D-4383-925D-C2C6300247FD}"/>
+              </a:ext>
+            </a:extLst>
+          </p:cNvPr>
+          <p:cNvPicPr>
+            <a:picLocks noChangeAspect="1"/>
+          </p:cNvPicPr>
+          <p:nvPr/>
+        </p:nvPicPr>
+        <p:blipFill>
+          <a:blip r:embed="rId16">
+            <a:extLst>
+              <a:ext uri="{28A0092B-C50C-407E-A947-70E740481C1C}">
+                <a14:useLocalDpi xmlns:a14="http://schemas.microsoft.com/office/drawing/2010/main" val="0"/>
+              </a:ext>
+            </a:extLst>
+          </a:blip>
+          <a:stretch>
+            <a:fillRect/>
+          </a:stretch>
+        </p:blipFill>
+        <p:spPr>
+          <a:xfrm>
+            <a:off x="-4279900" y="-762000"/>
+            <a:ext cx="15417800" cy="13614400"/>
           </a:xfrm>
           <a:prstGeom prst="rect">
             <a:avLst/>
@@ -10536,6 +10788,42 @@
           <a:xfrm>
             <a:off x="3667611" y="11430599"/>
             <a:ext cx="540000" cy="540000"/>
+          </a:xfrm>
+          <a:prstGeom prst="rect">
+            <a:avLst/>
+          </a:prstGeom>
+        </p:spPr>
+      </p:pic>
+      <p:pic>
+        <p:nvPicPr>
+          <p:cNvPr id="12" name="Image 11" descr="Une image contenant miroir, dessin&#10;&#10;Description générée automatiquement">
+            <a:extLst>
+              <a:ext uri="{FF2B5EF4-FFF2-40B4-BE49-F238E27FC236}">
+                <a16:creationId xmlns:a16="http://schemas.microsoft.com/office/drawing/2014/main" id="{47D41F56-5715-42A7-8036-B8B28C8111D9}"/>
+              </a:ext>
+            </a:extLst>
+          </p:cNvPr>
+          <p:cNvPicPr>
+            <a:picLocks noChangeAspect="1"/>
+          </p:cNvPicPr>
+          <p:nvPr/>
+        </p:nvPicPr>
+        <p:blipFill>
+          <a:blip r:embed="rId16">
+            <a:extLst>
+              <a:ext uri="{28A0092B-C50C-407E-A947-70E740481C1C}">
+                <a14:useLocalDpi xmlns:a14="http://schemas.microsoft.com/office/drawing/2010/main" val="0"/>
+              </a:ext>
+            </a:extLst>
+          </a:blip>
+          <a:stretch>
+            <a:fillRect/>
+          </a:stretch>
+        </p:blipFill>
+        <p:spPr>
+          <a:xfrm>
+            <a:off x="-4279900" y="-762000"/>
+            <a:ext cx="15417800" cy="13614400"/>
           </a:xfrm>
           <a:prstGeom prst="rect">
             <a:avLst/>

</xml_diff>

<commit_message>
recurrency and remove hidden file
</commit_message>
<xml_diff>
--- a/template/app-mockup.pptx
+++ b/template/app-mockup.pptx
@@ -7279,7 +7279,7 @@
           <a:p>
             <a:r>
               <a:rPr lang="fr-FR" sz="1400" dirty="0"/>
-              <a:t>OCCURRENCE (EN JOUR)</a:t>
+              <a:t>RÉCURRENCE (EN JOUR)</a:t>
             </a:r>
           </a:p>
         </p:txBody>
@@ -7750,10 +7750,10 @@
       </p:pic>
       <p:pic>
         <p:nvPicPr>
-          <p:cNvPr id="43" name="Image 42" descr="Une image contenant miroir, dessin&#10;&#10;Description générée automatiquement">
-            <a:extLst>
-              <a:ext uri="{FF2B5EF4-FFF2-40B4-BE49-F238E27FC236}">
-                <a16:creationId xmlns:a16="http://schemas.microsoft.com/office/drawing/2014/main" id="{341BCFFC-296E-4963-B0B0-A8FF1E0B24BD}"/>
+          <p:cNvPr id="57" name="Image 56" descr="Une image contenant miroir, dessin&#10;&#10;Description générée automatiquement">
+            <a:extLst>
+              <a:ext uri="{FF2B5EF4-FFF2-40B4-BE49-F238E27FC236}">
+                <a16:creationId xmlns:a16="http://schemas.microsoft.com/office/drawing/2014/main" id="{058D039B-9AF1-4AFB-A076-7760BABC9362}"/>
               </a:ext>
             </a:extLst>
           </p:cNvPr>

</xml_diff>